<commit_message>
last modification of final presentation
</commit_message>
<xml_diff>
--- a/doc/presentation-final/BestProtocolPresentationFinal05052023.pptx
+++ b/doc/presentation-final/BestProtocolPresentationFinal05052023.pptx
@@ -7067,7 +7067,7 @@
         <p:spPr/>
         <p:txBody>
           <a:bodyPr>
-            <a:normAutofit lnSpcReduction="10000"/>
+            <a:normAutofit fontScale="70000" lnSpcReduction="20000"/>
           </a:bodyPr>
           <a:lstStyle/>
           <a:p>
@@ -7081,8 +7081,12 @@
               <a:buNone/>
             </a:pPr>
             <a:r>
-              <a:rPr lang="hu-HU" smtClean="0"/>
-              <a:t>Készítették:</a:t>
+              <a:rPr lang="hu-HU" sz="2300" b="1" smtClean="0">
+                <a:solidFill>
+                  <a:srgbClr val="0070C0"/>
+                </a:solidFill>
+              </a:rPr>
+              <a:t>Külön köszönet: Grúber Péter (az összes erőfeszítés a host megvalósítása érdekében!)</a:t>
             </a:r>
           </a:p>
           <a:p>
@@ -7092,8 +7096,27 @@
             <a:endParaRPr lang="hu-HU" smtClean="0"/>
           </a:p>
           <a:p>
-            <a:r>
-              <a:rPr lang="hu-HU" sz="2600" smtClean="0">
+            <a:pPr marL="0" indent="0">
+              <a:buNone/>
+            </a:pPr>
+            <a:r>
+              <a:rPr lang="hu-HU" smtClean="0"/>
+              <a:t>Készítették</a:t>
+            </a:r>
+            <a:r>
+              <a:rPr lang="hu-HU" smtClean="0"/>
+              <a:t>:</a:t>
+            </a:r>
+          </a:p>
+          <a:p>
+            <a:pPr marL="0" indent="0">
+              <a:buNone/>
+            </a:pPr>
+            <a:endParaRPr lang="hu-HU" smtClean="0"/>
+          </a:p>
+          <a:p>
+            <a:r>
+              <a:rPr lang="hu-HU" sz="3100" smtClean="0">
                 <a:latin typeface="Blackadder ITC" panose="04020505051007020D02" pitchFamily="82" charset="0"/>
               </a:rPr>
               <a:t>Oláh Dóra</a:t>
@@ -7101,7 +7124,7 @@
           </a:p>
           <a:p>
             <a:r>
-              <a:rPr lang="hu-HU" sz="2600" smtClean="0">
+              <a:rPr lang="hu-HU" sz="3100" smtClean="0">
                 <a:latin typeface="Blackadder ITC" panose="04020505051007020D02" pitchFamily="82" charset="0"/>
               </a:rPr>
               <a:t>Surányi Krisztina</a:t>
@@ -7109,7 +7132,7 @@
           </a:p>
           <a:p>
             <a:r>
-              <a:rPr lang="hu-HU" sz="2600" smtClean="0">
+              <a:rPr lang="hu-HU" sz="3100" smtClean="0">
                 <a:latin typeface="Blackadder ITC" panose="04020505051007020D02" pitchFamily="82" charset="0"/>
               </a:rPr>
               <a:t>Bondor Dániel</a:t>
@@ -7117,7 +7140,7 @@
           </a:p>
           <a:p>
             <a:r>
-              <a:rPr lang="hu-HU" sz="2600" smtClean="0">
+              <a:rPr lang="hu-HU" sz="3100" smtClean="0">
                 <a:latin typeface="Blackadder ITC" panose="04020505051007020D02" pitchFamily="82" charset="0"/>
               </a:rPr>
               <a:t>Szénási Tamás</a:t>
@@ -7125,7 +7148,7 @@
           </a:p>
           <a:p>
             <a:r>
-              <a:rPr lang="hu-HU" sz="2600" smtClean="0">
+              <a:rPr lang="hu-HU" sz="3100" smtClean="0">
                 <a:latin typeface="Blackadder ITC" panose="04020505051007020D02" pitchFamily="82" charset="0"/>
               </a:rPr>
               <a:t>Vadász Csaba</a:t>

</xml_diff>